<commit_message>
Revision of presentation slides.
</commit_message>
<xml_diff>
--- a/presentation_slides/Slides_AlexCraig.pptx
+++ b/presentation_slides/Slides_AlexCraig.pptx
@@ -5,26 +5,25 @@
     <p:sldMasterId id="2147483648" r:id="rId1"/>
   </p:sldMasterIdLst>
   <p:notesMasterIdLst>
-    <p:notesMasterId r:id="rId16"/>
+    <p:notesMasterId r:id="rId15"/>
   </p:notesMasterIdLst>
   <p:handoutMasterIdLst>
-    <p:handoutMasterId r:id="rId17"/>
+    <p:handoutMasterId r:id="rId16"/>
   </p:handoutMasterIdLst>
   <p:sldIdLst>
     <p:sldId id="256" r:id="rId2"/>
     <p:sldId id="258" r:id="rId3"/>
     <p:sldId id="276" r:id="rId4"/>
-    <p:sldId id="271" r:id="rId5"/>
-    <p:sldId id="275" r:id="rId6"/>
-    <p:sldId id="272" r:id="rId7"/>
-    <p:sldId id="277" r:id="rId8"/>
+    <p:sldId id="275" r:id="rId5"/>
+    <p:sldId id="272" r:id="rId6"/>
+    <p:sldId id="277" r:id="rId7"/>
+    <p:sldId id="278" r:id="rId8"/>
     <p:sldId id="281" r:id="rId9"/>
     <p:sldId id="282" r:id="rId10"/>
     <p:sldId id="283" r:id="rId11"/>
-    <p:sldId id="278" r:id="rId12"/>
-    <p:sldId id="284" r:id="rId13"/>
-    <p:sldId id="280" r:id="rId14"/>
-    <p:sldId id="273" r:id="rId15"/>
+    <p:sldId id="284" r:id="rId12"/>
+    <p:sldId id="280" r:id="rId13"/>
+    <p:sldId id="273" r:id="rId14"/>
   </p:sldIdLst>
   <p:sldSz cx="9144000" cy="6858000" type="screen4x3"/>
   <p:notesSz cx="6858000" cy="9144000"/>
@@ -1193,60 +1192,7 @@
           </a:bodyPr>
           <a:lstStyle/>
           <a:p>
-            <a:r>
-              <a:rPr lang="en-CA" dirty="0" err="1" smtClean="0"/>
-              <a:t>TeraGrid</a:t>
-            </a:r>
-            <a:r>
-              <a:rPr lang="en-CA" dirty="0" smtClean="0"/>
-              <a:t> is an open scientific discovery infrastructure combining leadership class resources at 11 partner sites to create an integrated, persistent computational resource.</a:t>
-            </a:r>
-          </a:p>
-          <a:p>
-            <a:r>
-              <a:rPr lang="en-CA" dirty="0" smtClean="0"/>
-              <a:t>Using high-performance network connections, </a:t>
-            </a:r>
-            <a:r>
-              <a:rPr lang="en-CA" dirty="0" err="1" smtClean="0"/>
-              <a:t>TeraGrid</a:t>
-            </a:r>
-            <a:r>
-              <a:rPr lang="en-CA" dirty="0" smtClean="0"/>
-              <a:t> integrates high-performance computers, data resources and tools, and high-end experimental facilities around the country. Currently, </a:t>
-            </a:r>
-            <a:r>
-              <a:rPr lang="en-CA" dirty="0" err="1" smtClean="0"/>
-              <a:t>TeraGrid</a:t>
-            </a:r>
-            <a:r>
-              <a:rPr lang="en-CA" dirty="0" smtClean="0"/>
-              <a:t> resources include more than 2.5 </a:t>
-            </a:r>
-            <a:r>
-              <a:rPr lang="en-CA" dirty="0" err="1" smtClean="0"/>
-              <a:t>petaflops</a:t>
-            </a:r>
-            <a:r>
-              <a:rPr lang="en-CA" dirty="0" smtClean="0"/>
-              <a:t> of computing capability and more than 50 </a:t>
-            </a:r>
-            <a:r>
-              <a:rPr lang="en-CA" dirty="0" err="1" smtClean="0"/>
-              <a:t>petabytes</a:t>
-            </a:r>
-            <a:r>
-              <a:rPr lang="en-CA" dirty="0" smtClean="0"/>
-              <a:t> of online and archival data </a:t>
-            </a:r>
-            <a:r>
-              <a:rPr lang="en-CA" dirty="0" err="1" smtClean="0"/>
-              <a:t>storag</a:t>
-            </a:r>
-            <a:endParaRPr lang="en-CA" dirty="0" smtClean="0"/>
-          </a:p>
-          <a:p>
-            <a:endParaRPr lang="en-CA" dirty="0"/>
+            <a:endParaRPr lang="en-CA"/>
           </a:p>
         </p:txBody>
       </p:sp>
@@ -1269,88 +1215,6 @@
               <a:rPr lang="en-US" smtClean="0"/>
               <a:pPr/>
               <a:t>13</a:t>
-            </a:fld>
-            <a:endParaRPr lang="en-US"/>
-          </a:p>
-        </p:txBody>
-      </p:sp>
-    </p:spTree>
-  </p:cSld>
-  <p:clrMapOvr>
-    <a:masterClrMapping/>
-  </p:clrMapOvr>
-</p:notes>
-</file>
-
-<file path=ppt/notesSlides/notesSlide13.xml><?xml version="1.0" encoding="utf-8"?>
-<p:notes xmlns:a="http://schemas.openxmlformats.org/drawingml/2006/main" xmlns:r="http://schemas.openxmlformats.org/officeDocument/2006/relationships" xmlns:p="http://schemas.openxmlformats.org/presentationml/2006/main">
-  <p:cSld>
-    <p:spTree>
-      <p:nvGrpSpPr>
-        <p:cNvPr id="1" name=""/>
-        <p:cNvGrpSpPr/>
-        <p:nvPr/>
-      </p:nvGrpSpPr>
-      <p:grpSpPr>
-        <a:xfrm>
-          <a:off x="0" y="0"/>
-          <a:ext cx="0" cy="0"/>
-          <a:chOff x="0" y="0"/>
-          <a:chExt cx="0" cy="0"/>
-        </a:xfrm>
-      </p:grpSpPr>
-      <p:sp>
-        <p:nvSpPr>
-          <p:cNvPr id="2" name="Slide Image Placeholder 1"/>
-          <p:cNvSpPr>
-            <a:spLocks noGrp="1" noRot="1" noChangeAspect="1"/>
-          </p:cNvSpPr>
-          <p:nvPr>
-            <p:ph type="sldImg"/>
-          </p:nvPr>
-        </p:nvSpPr>
-        <p:spPr/>
-      </p:sp>
-      <p:sp>
-        <p:nvSpPr>
-          <p:cNvPr id="3" name="Notes Placeholder 2"/>
-          <p:cNvSpPr>
-            <a:spLocks noGrp="1"/>
-          </p:cNvSpPr>
-          <p:nvPr>
-            <p:ph type="body" idx="1"/>
-          </p:nvPr>
-        </p:nvSpPr>
-        <p:spPr/>
-        <p:txBody>
-          <a:bodyPr>
-            <a:normAutofit/>
-          </a:bodyPr>
-          <a:lstStyle/>
-          <a:p>
-            <a:endParaRPr lang="en-CA"/>
-          </a:p>
-        </p:txBody>
-      </p:sp>
-      <p:sp>
-        <p:nvSpPr>
-          <p:cNvPr id="4" name="Slide Number Placeholder 3"/>
-          <p:cNvSpPr>
-            <a:spLocks noGrp="1"/>
-          </p:cNvSpPr>
-          <p:nvPr>
-            <p:ph type="sldNum" sz="quarter" idx="10"/>
-          </p:nvPr>
-        </p:nvSpPr>
-        <p:spPr/>
-        <p:txBody>
-          <a:bodyPr/>
-          <a:lstStyle/>
-          <a:p>
-            <a:fld id="{E00E7371-80A2-4894-A71A-E39284D7ECA2}" type="slidenum">
-              <a:rPr lang="en-US" smtClean="0"/>
-              <a:pPr/>
-              <a:t>14</a:t>
             </a:fld>
             <a:endParaRPr lang="en-US"/>
           </a:p>
@@ -1738,7 +1602,60 @@
           </a:bodyPr>
           <a:lstStyle/>
           <a:p>
-            <a:endParaRPr lang="en-CA"/>
+            <a:r>
+              <a:rPr lang="en-CA" dirty="0" err="1" smtClean="0"/>
+              <a:t>TeraGrid</a:t>
+            </a:r>
+            <a:r>
+              <a:rPr lang="en-CA" dirty="0" smtClean="0"/>
+              <a:t> is an open scientific discovery infrastructure combining leadership class resources at 11 partner sites to create an integrated, persistent computational resource.</a:t>
+            </a:r>
+          </a:p>
+          <a:p>
+            <a:r>
+              <a:rPr lang="en-CA" dirty="0" smtClean="0"/>
+              <a:t>Using high-performance network connections, </a:t>
+            </a:r>
+            <a:r>
+              <a:rPr lang="en-CA" dirty="0" err="1" smtClean="0"/>
+              <a:t>TeraGrid</a:t>
+            </a:r>
+            <a:r>
+              <a:rPr lang="en-CA" dirty="0" smtClean="0"/>
+              <a:t> integrates high-performance computers, data resources and tools, and high-end experimental facilities around the country. Currently, </a:t>
+            </a:r>
+            <a:r>
+              <a:rPr lang="en-CA" dirty="0" err="1" smtClean="0"/>
+              <a:t>TeraGrid</a:t>
+            </a:r>
+            <a:r>
+              <a:rPr lang="en-CA" dirty="0" smtClean="0"/>
+              <a:t> resources include more than 2.5 </a:t>
+            </a:r>
+            <a:r>
+              <a:rPr lang="en-CA" dirty="0" err="1" smtClean="0"/>
+              <a:t>petaflops</a:t>
+            </a:r>
+            <a:r>
+              <a:rPr lang="en-CA" dirty="0" smtClean="0"/>
+              <a:t> of computing capability and more than 50 </a:t>
+            </a:r>
+            <a:r>
+              <a:rPr lang="en-CA" dirty="0" err="1" smtClean="0"/>
+              <a:t>petabytes</a:t>
+            </a:r>
+            <a:r>
+              <a:rPr lang="en-CA" dirty="0" smtClean="0"/>
+              <a:t> of online and archival data </a:t>
+            </a:r>
+            <a:r>
+              <a:rPr lang="en-CA" dirty="0" err="1" smtClean="0"/>
+              <a:t>storag</a:t>
+            </a:r>
+            <a:endParaRPr lang="en-CA" dirty="0" smtClean="0"/>
+          </a:p>
+          <a:p>
+            <a:endParaRPr lang="en-CA" dirty="0"/>
           </a:p>
         </p:txBody>
       </p:sp>
@@ -1961,9 +1878,38 @@
             </a:r>
             <a:r>
               <a:rPr lang="en-CA" baseline="0" dirty="0" smtClean="0"/>
-              <a:t> as hardware is heterogeneous and under separate control of multiple authorities.</a:t>
-            </a:r>
-            <a:endParaRPr lang="en-CA" dirty="0"/>
+              <a:t> as hardware is heterogeneous and under separate control of multiple authorities</a:t>
+            </a:r>
+            <a:r>
+              <a:rPr lang="en-CA" baseline="0" dirty="0" smtClean="0"/>
+              <a:t>.</a:t>
+            </a:r>
+          </a:p>
+          <a:p>
+            <a:endParaRPr lang="en-CA" baseline="0" dirty="0" smtClean="0"/>
+          </a:p>
+          <a:p>
+            <a:pPr marL="0" marR="0" lvl="0" indent="0" algn="l" defTabSz="914400" rtl="0" eaLnBrk="1" fontAlgn="base" latinLnBrk="0" hangingPunct="1">
+              <a:lnSpc>
+                <a:spcPct val="100000"/>
+              </a:lnSpc>
+              <a:spcBef>
+                <a:spcPct val="30000"/>
+              </a:spcBef>
+              <a:spcAft>
+                <a:spcPct val="0"/>
+              </a:spcAft>
+              <a:buClrTx/>
+              <a:buSzTx/>
+              <a:buFontTx/>
+              <a:buNone/>
+              <a:tabLst/>
+              <a:defRPr/>
+            </a:pPr>
+            <a:r>
+              <a:rPr lang="en-CA" sz="1200" dirty="0" smtClean="0"/>
+              <a:t>While performance limited this technique in the past, hardware support for virtualization now makes this technique feasible.</a:t>
+            </a:r>
           </a:p>
         </p:txBody>
       </p:sp>
@@ -5070,23 +5016,7 @@
           <a:p>
             <a:r>
               <a:rPr lang="en-CA" sz="2400" dirty="0" smtClean="0"/>
-              <a:t>For example, a single server machine </a:t>
-            </a:r>
-            <a:r>
-              <a:rPr lang="en-CA" sz="2400" dirty="0" smtClean="0"/>
-              <a:t>may use virtualization to </a:t>
-            </a:r>
-            <a:r>
-              <a:rPr lang="en-CA" sz="2400" dirty="0" smtClean="0"/>
-              <a:t>run multiple virtual instances and appear to </a:t>
-            </a:r>
-            <a:r>
-              <a:rPr lang="en-CA" sz="2400" dirty="0" smtClean="0"/>
-              <a:t>clients as </a:t>
-            </a:r>
-            <a:r>
-              <a:rPr lang="en-CA" sz="2400" dirty="0" smtClean="0"/>
-              <a:t>multiple servers (much the same way that threads allow a single processor to appear as multiple parallel processors)</a:t>
+              <a:t>For example, a single server machine may use virtualization to run multiple virtual instances and appear to clients as multiple servers (much the same way that threads allow a single processor to appear as multiple parallel processors)</a:t>
             </a:r>
           </a:p>
           <a:p>
@@ -5112,8 +5042,8 @@
         </p:blipFill>
         <p:spPr bwMode="auto">
           <a:xfrm>
-            <a:off x="2286000" y="4618848"/>
-            <a:ext cx="6155012" cy="1553352"/>
+            <a:off x="2590800" y="4648200"/>
+            <a:ext cx="5257800" cy="1326921"/>
           </a:xfrm>
           <a:prstGeom prst="rect">
             <a:avLst/>
@@ -5211,78 +5141,6 @@
       </p:grpSpPr>
       <p:sp>
         <p:nvSpPr>
-          <p:cNvPr id="11" name="TextBox 10"/>
-          <p:cNvSpPr txBox="1"/>
-          <p:nvPr/>
-        </p:nvSpPr>
-        <p:spPr>
-          <a:xfrm>
-            <a:off x="6324600" y="3657600"/>
-            <a:ext cx="2667000" cy="2308324"/>
-          </a:xfrm>
-          <a:prstGeom prst="rect">
-            <a:avLst/>
-          </a:prstGeom>
-        </p:spPr>
-        <p:style>
-          <a:lnRef idx="1">
-            <a:schemeClr val="accent5"/>
-          </a:lnRef>
-          <a:fillRef idx="2">
-            <a:schemeClr val="accent5"/>
-          </a:fillRef>
-          <a:effectRef idx="1">
-            <a:schemeClr val="accent5"/>
-          </a:effectRef>
-          <a:fontRef idx="minor">
-            <a:schemeClr val="dk1"/>
-          </a:fontRef>
-        </p:style>
-        <p:txBody>
-          <a:bodyPr wrap="square" rtlCol="0">
-            <a:spAutoFit/>
-          </a:bodyPr>
-          <a:lstStyle/>
-          <a:p>
-            <a:endParaRPr lang="en-CA" sz="1600" dirty="0" smtClean="0">
-              <a:latin typeface="+mn-lt"/>
-            </a:endParaRPr>
-          </a:p>
-          <a:p>
-            <a:endParaRPr lang="en-CA" sz="1600" dirty="0" smtClean="0"/>
-          </a:p>
-          <a:p>
-            <a:endParaRPr lang="en-CA" sz="1600" dirty="0" smtClean="0">
-              <a:latin typeface="+mn-lt"/>
-            </a:endParaRPr>
-          </a:p>
-          <a:p>
-            <a:endParaRPr lang="en-CA" sz="1600" dirty="0" smtClean="0"/>
-          </a:p>
-          <a:p>
-            <a:endParaRPr lang="en-CA" sz="1600" dirty="0" smtClean="0"/>
-          </a:p>
-          <a:p>
-            <a:r>
-              <a:rPr lang="en-CA" sz="1600" dirty="0" err="1" smtClean="0">
-                <a:latin typeface="+mn-lt"/>
-              </a:rPr>
-              <a:t>TeraGrid</a:t>
-            </a:r>
-            <a:r>
-              <a:rPr lang="en-CA" sz="1600" dirty="0" smtClean="0">
-                <a:latin typeface="+mn-lt"/>
-              </a:rPr>
-              <a:t> is a scientific computing Grid with 11 partner sites in North America [ac7]</a:t>
-            </a:r>
-            <a:endParaRPr lang="en-CA" sz="1600" dirty="0">
-              <a:latin typeface="+mn-lt"/>
-            </a:endParaRPr>
-          </a:p>
-        </p:txBody>
-      </p:sp>
-      <p:sp>
-        <p:nvSpPr>
           <p:cNvPr id="4" name="Slide Number Placeholder 3"/>
           <p:cNvSpPr>
             <a:spLocks noGrp="1"/>
@@ -5321,12 +5179,12 @@
           <a:lstStyle/>
           <a:p>
             <a:r>
-              <a:rPr lang="en-US" dirty="0" smtClean="0"/>
-              <a:t>Clouds and Grids: </a:t>
-            </a:r>
-            <a:r>
               <a:rPr lang="en-US" b="1" dirty="0" smtClean="0"/>
-              <a:t>Business Model</a:t>
+              <a:t>Application </a:t>
+            </a:r>
+            <a:r>
+              <a:rPr lang="en-US" b="1" dirty="0" smtClean="0"/>
+              <a:t>Model</a:t>
             </a:r>
             <a:endParaRPr lang="en-US" b="1" dirty="0"/>
           </a:p>
@@ -5345,68 +5203,23 @@
         <p:spPr>
           <a:xfrm>
             <a:off x="1981200" y="1676400"/>
-            <a:ext cx="6858000" cy="1981200"/>
+            <a:ext cx="6858000" cy="762000"/>
           </a:xfrm>
         </p:spPr>
         <p:txBody>
           <a:bodyPr/>
           <a:lstStyle/>
           <a:p>
-            <a:pPr lvl="0"/>
-            <a:r>
-              <a:rPr lang="en-CA" sz="2400" b="1" dirty="0" smtClean="0"/>
-              <a:t>Clouds: </a:t>
-            </a:r>
-            <a:r>
-              <a:rPr lang="en-CA" sz="2400" dirty="0" smtClean="0"/>
-              <a:t>Customers pay for processing power on a consumption basis. Resources are dynamically provisioned, and customers pay only for what they use.</a:t>
-            </a:r>
-          </a:p>
-          <a:p>
-            <a:pPr lvl="0"/>
-            <a:endParaRPr lang="en-CA" sz="2400" dirty="0" smtClean="0">
-              <a:solidFill>
-                <a:schemeClr val="tx1"/>
-              </a:solidFill>
-              <a:latin typeface="+mn-lt"/>
-              <a:ea typeface="+mn-ea"/>
-              <a:cs typeface="+mn-cs"/>
-            </a:endParaRPr>
-          </a:p>
-        </p:txBody>
-      </p:sp>
-      <p:pic>
-        <p:nvPicPr>
-          <p:cNvPr id="2050" name="Picture 2"/>
-          <p:cNvPicPr>
-            <a:picLocks noChangeAspect="1" noChangeArrowheads="1"/>
-          </p:cNvPicPr>
-          <p:nvPr/>
-        </p:nvPicPr>
-        <p:blipFill>
-          <a:blip r:embed="rId3" cstate="print"/>
-          <a:srcRect/>
-          <a:stretch>
-            <a:fillRect/>
-          </a:stretch>
-        </p:blipFill>
-        <p:spPr bwMode="auto">
-          <a:xfrm>
-            <a:off x="6473192" y="3733800"/>
-            <a:ext cx="2442208" cy="1075863"/>
-          </a:xfrm>
-          <a:prstGeom prst="rect">
-            <a:avLst/>
-          </a:prstGeom>
-          <a:noFill/>
-          <a:ln w="9525">
-            <a:noFill/>
-            <a:miter lim="800000"/>
-            <a:headEnd/>
-            <a:tailEnd/>
-          </a:ln>
-        </p:spPr>
-      </p:pic>
+            <a:pPr lvl="0">
+              <a:buNone/>
+            </a:pPr>
+            <a:r>
+              <a:rPr lang="en-CA" sz="2000" b="1" dirty="0" smtClean="0"/>
+              <a:t>Although both paradigms can be used for a wide variety of applications, some general trends can be noted:</a:t>
+            </a:r>
+          </a:p>
+        </p:txBody>
+      </p:sp>
       <p:sp>
         <p:nvSpPr>
           <p:cNvPr id="10" name="Rectangle 5"/>
@@ -5417,8 +5230,8 @@
         </p:nvSpPr>
         <p:spPr bwMode="auto">
           <a:xfrm>
-            <a:off x="1981200" y="3657600"/>
-            <a:ext cx="4267200" cy="2743200"/>
+            <a:off x="1981200" y="2667000"/>
+            <a:ext cx="6781800" cy="4114800"/>
           </a:xfrm>
           <a:prstGeom prst="rect">
             <a:avLst/>
@@ -5440,6 +5253,33 @@
           </a:bodyPr>
           <a:lstStyle/>
           <a:p>
+            <a:pPr marL="342900" indent="-342900" eaLnBrk="1" hangingPunct="1">
+              <a:lnSpc>
+                <a:spcPct val="120000"/>
+              </a:lnSpc>
+              <a:spcBef>
+                <a:spcPct val="20000"/>
+              </a:spcBef>
+              <a:buClr>
+                <a:srgbClr val="F10040"/>
+              </a:buClr>
+              <a:buFont typeface="Wingdings" pitchFamily="2" charset="2"/>
+              <a:buChar char="§"/>
+            </a:pPr>
+            <a:r>
+              <a:rPr lang="en-CA" b="1" dirty="0" smtClean="0">
+                <a:latin typeface="+mn-lt"/>
+              </a:rPr>
+              <a:t>Clouds: </a:t>
+            </a:r>
+            <a:r>
+              <a:rPr lang="en-CA" dirty="0" smtClean="0">
+                <a:latin typeface="+mn-lt"/>
+              </a:rPr>
+              <a:t>Applications tend to be loosely coupled, transaction oriented (many small and relatively quick tasks), and interactive.</a:t>
+            </a:r>
+          </a:p>
+          <a:p>
             <a:pPr marL="342900" lvl="0" indent="-342900" eaLnBrk="1" hangingPunct="1">
               <a:lnSpc>
                 <a:spcPct val="120000"/>
@@ -5453,6 +5293,24 @@
               <a:buFont typeface="Wingdings" pitchFamily="2" charset="2"/>
               <a:buChar char="§"/>
             </a:pPr>
+            <a:endParaRPr lang="en-CA" b="1" kern="0" dirty="0" smtClean="0">
+              <a:latin typeface="+mn-lt"/>
+            </a:endParaRPr>
+          </a:p>
+          <a:p>
+            <a:pPr marL="342900" lvl="0" indent="-342900" eaLnBrk="1" hangingPunct="1">
+              <a:lnSpc>
+                <a:spcPct val="120000"/>
+              </a:lnSpc>
+              <a:spcBef>
+                <a:spcPct val="20000"/>
+              </a:spcBef>
+              <a:buClr>
+                <a:srgbClr val="F10040"/>
+              </a:buClr>
+              <a:buFont typeface="Wingdings" pitchFamily="2" charset="2"/>
+              <a:buChar char="§"/>
+            </a:pPr>
             <a:r>
               <a:rPr lang="en-CA" b="1" kern="0" dirty="0" smtClean="0">
                 <a:latin typeface="+mn-lt"/>
@@ -5463,7 +5321,7 @@
               <a:rPr lang="en-CA" kern="0" dirty="0" smtClean="0">
                 <a:latin typeface="+mn-lt"/>
               </a:rPr>
-              <a:t>Distribution of resources is project oriented, and projects must submit proposals to obtain a fixed number of service units (ex. CPU hours).</a:t>
+              <a:t>Grids support a wide range of applications, but jobs tend to be batch scheduled and non-interactive.</a:t>
             </a:r>
           </a:p>
           <a:p>
@@ -5572,18 +5430,19 @@
             <p:ph type="title"/>
           </p:nvPr>
         </p:nvSpPr>
-        <p:spPr/>
+        <p:spPr>
+          <a:xfrm>
+            <a:off x="1981200" y="1143000"/>
+            <a:ext cx="6858000" cy="914400"/>
+          </a:xfrm>
+        </p:spPr>
         <p:txBody>
           <a:bodyPr/>
           <a:lstStyle/>
           <a:p>
             <a:r>
-              <a:rPr lang="en-US" dirty="0" smtClean="0"/>
-              <a:t>Clouds and Grids: </a:t>
-            </a:r>
-            <a:r>
               <a:rPr lang="en-US" b="1" dirty="0" smtClean="0"/>
-              <a:t>Application Model</a:t>
+              <a:t>Interoperability</a:t>
             </a:r>
             <a:endParaRPr lang="en-US" b="1" dirty="0"/>
           </a:p>
@@ -5601,22 +5460,34 @@
         </p:nvSpPr>
         <p:spPr>
           <a:xfrm>
-            <a:off x="1981200" y="1676400"/>
-            <a:ext cx="6858000" cy="762000"/>
+            <a:off x="1981200" y="1600200"/>
+            <a:ext cx="6858000" cy="1981200"/>
           </a:xfrm>
         </p:spPr>
         <p:txBody>
           <a:bodyPr/>
           <a:lstStyle/>
           <a:p>
-            <a:pPr lvl="0">
-              <a:buNone/>
-            </a:pPr>
-            <a:r>
-              <a:rPr lang="en-CA" sz="2000" b="1" dirty="0" smtClean="0"/>
-              <a:t>Although both paradigms can be used for a wide variety of applications, some general trends can be noted:</a:t>
-            </a:r>
-            <a:endParaRPr lang="en-CA" sz="2000" b="1" dirty="0" smtClean="0"/>
+            <a:pPr lvl="0"/>
+            <a:r>
+              <a:rPr lang="en-CA" sz="2400" b="1" dirty="0" smtClean="0"/>
+              <a:t>Clouds: </a:t>
+            </a:r>
+            <a:r>
+              <a:rPr lang="en-CA" sz="2400" dirty="0" smtClean="0"/>
+              <a:t>Cloud are generally operated by a single provider with homogenous hardware. No standardized interfaces exist between the major cloud providers, leading to interoperability issues.</a:t>
+            </a:r>
+          </a:p>
+          <a:p>
+            <a:pPr lvl="0"/>
+            <a:endParaRPr lang="en-CA" sz="2400" dirty="0" smtClean="0">
+              <a:solidFill>
+                <a:schemeClr val="tx1"/>
+              </a:solidFill>
+              <a:latin typeface="+mn-lt"/>
+              <a:ea typeface="+mn-ea"/>
+              <a:cs typeface="+mn-cs"/>
+            </a:endParaRPr>
           </a:p>
         </p:txBody>
       </p:sp>
@@ -5630,8 +5501,8 @@
         </p:nvSpPr>
         <p:spPr bwMode="auto">
           <a:xfrm>
-            <a:off x="1981200" y="2667000"/>
-            <a:ext cx="6781800" cy="4114800"/>
+            <a:off x="1981200" y="4038600"/>
+            <a:ext cx="6705600" cy="2743200"/>
           </a:xfrm>
           <a:prstGeom prst="rect">
             <a:avLst/>
@@ -5653,33 +5524,6 @@
           </a:bodyPr>
           <a:lstStyle/>
           <a:p>
-            <a:pPr marL="342900" indent="-342900" eaLnBrk="1" hangingPunct="1">
-              <a:lnSpc>
-                <a:spcPct val="120000"/>
-              </a:lnSpc>
-              <a:spcBef>
-                <a:spcPct val="20000"/>
-              </a:spcBef>
-              <a:buClr>
-                <a:srgbClr val="F10040"/>
-              </a:buClr>
-              <a:buFont typeface="Wingdings" pitchFamily="2" charset="2"/>
-              <a:buChar char="§"/>
-            </a:pPr>
-            <a:r>
-              <a:rPr lang="en-CA" b="1" dirty="0" smtClean="0">
-                <a:latin typeface="+mn-lt"/>
-              </a:rPr>
-              <a:t>Clouds: </a:t>
-            </a:r>
-            <a:r>
-              <a:rPr lang="en-CA" dirty="0" smtClean="0">
-                <a:latin typeface="+mn-lt"/>
-              </a:rPr>
-              <a:t>Applications tend to be loosely coupled, transaction oriented (many small and relatively quick tasks), and interactive.</a:t>
-            </a:r>
-          </a:p>
-          <a:p>
             <a:pPr marL="342900" lvl="0" indent="-342900" eaLnBrk="1" hangingPunct="1">
               <a:lnSpc>
                 <a:spcPct val="120000"/>
@@ -5693,45 +5537,18 @@
               <a:buFont typeface="Wingdings" pitchFamily="2" charset="2"/>
               <a:buChar char="§"/>
             </a:pPr>
-            <a:endParaRPr lang="en-CA" b="1" kern="0" dirty="0" smtClean="0">
-              <a:latin typeface="+mn-lt"/>
-            </a:endParaRPr>
-          </a:p>
-          <a:p>
-            <a:pPr marL="342900" lvl="0" indent="-342900" eaLnBrk="1" hangingPunct="1">
-              <a:lnSpc>
-                <a:spcPct val="120000"/>
-              </a:lnSpc>
-              <a:spcBef>
-                <a:spcPct val="20000"/>
-              </a:spcBef>
-              <a:buClr>
-                <a:srgbClr val="F10040"/>
-              </a:buClr>
-              <a:buFont typeface="Wingdings" pitchFamily="2" charset="2"/>
-              <a:buChar char="§"/>
-            </a:pPr>
             <a:r>
               <a:rPr lang="en-CA" b="1" kern="0" dirty="0" smtClean="0">
                 <a:latin typeface="+mn-lt"/>
               </a:rPr>
-              <a:t>Grids</a:t>
-            </a:r>
-            <a:r>
-              <a:rPr lang="en-CA" b="1" kern="0" dirty="0" smtClean="0">
-                <a:latin typeface="+mn-lt"/>
-              </a:rPr>
-              <a:t>: </a:t>
+              <a:t>Grids: </a:t>
             </a:r>
             <a:r>
               <a:rPr lang="en-CA" kern="0" dirty="0" smtClean="0">
                 <a:latin typeface="+mn-lt"/>
               </a:rPr>
-              <a:t>Grids support a wide range of applications, but jobs tend to be batch scheduled and non-interactive.</a:t>
-            </a:r>
-            <a:endParaRPr lang="en-CA" kern="0" dirty="0" smtClean="0">
-              <a:latin typeface="+mn-lt"/>
-            </a:endParaRPr>
+              <a:t>Interoperability and security are primary concerns. Grid sites are often run by separate administrative authorities with heterogeneous hardware, and therefore the use of standardized interfaces, protocols, toolsets, and middleware is essential.</a:t>
+            </a:r>
           </a:p>
           <a:p>
             <a:pPr marL="342900" marR="0" lvl="0" indent="-342900" algn="l" defTabSz="914400" rtl="0" eaLnBrk="1" fontAlgn="base" latinLnBrk="0" hangingPunct="1">
@@ -5839,239 +5656,6 @@
             <p:ph type="title"/>
           </p:nvPr>
         </p:nvSpPr>
-        <p:spPr>
-          <a:xfrm>
-            <a:off x="1981200" y="1143000"/>
-            <a:ext cx="6858000" cy="914400"/>
-          </a:xfrm>
-        </p:spPr>
-        <p:txBody>
-          <a:bodyPr/>
-          <a:lstStyle/>
-          <a:p>
-            <a:r>
-              <a:rPr lang="en-US" dirty="0" smtClean="0"/>
-              <a:t>Clouds and Grids:</a:t>
-            </a:r>
-            <a:r>
-              <a:rPr lang="en-US" b="1" dirty="0" smtClean="0"/>
-              <a:t> Interoperability</a:t>
-            </a:r>
-            <a:endParaRPr lang="en-US" b="1" dirty="0"/>
-          </a:p>
-        </p:txBody>
-      </p:sp>
-      <p:sp>
-        <p:nvSpPr>
-          <p:cNvPr id="4101" name="Rectangle 5"/>
-          <p:cNvSpPr>
-            <a:spLocks noGrp="1" noChangeArrowheads="1"/>
-          </p:cNvSpPr>
-          <p:nvPr>
-            <p:ph type="body" idx="1"/>
-          </p:nvPr>
-        </p:nvSpPr>
-        <p:spPr>
-          <a:xfrm>
-            <a:off x="1981200" y="1600200"/>
-            <a:ext cx="6858000" cy="1981200"/>
-          </a:xfrm>
-        </p:spPr>
-        <p:txBody>
-          <a:bodyPr/>
-          <a:lstStyle/>
-          <a:p>
-            <a:pPr lvl="0"/>
-            <a:r>
-              <a:rPr lang="en-CA" sz="2400" b="1" dirty="0" smtClean="0"/>
-              <a:t>Clouds: </a:t>
-            </a:r>
-            <a:r>
-              <a:rPr lang="en-CA" sz="2400" dirty="0" smtClean="0"/>
-              <a:t>Cloud are generally operated by a single provider with homogenous hardware. No standardized interfaces exist between the major cloud providers, leading to interoperability issues.</a:t>
-            </a:r>
-          </a:p>
-          <a:p>
-            <a:pPr lvl="0"/>
-            <a:endParaRPr lang="en-CA" sz="2400" dirty="0" smtClean="0">
-              <a:solidFill>
-                <a:schemeClr val="tx1"/>
-              </a:solidFill>
-              <a:latin typeface="+mn-lt"/>
-              <a:ea typeface="+mn-ea"/>
-              <a:cs typeface="+mn-cs"/>
-            </a:endParaRPr>
-          </a:p>
-        </p:txBody>
-      </p:sp>
-      <p:sp>
-        <p:nvSpPr>
-          <p:cNvPr id="10" name="Rectangle 5"/>
-          <p:cNvSpPr txBox="1">
-            <a:spLocks noChangeArrowheads="1"/>
-          </p:cNvSpPr>
-          <p:nvPr/>
-        </p:nvSpPr>
-        <p:spPr bwMode="auto">
-          <a:xfrm>
-            <a:off x="1981200" y="4038600"/>
-            <a:ext cx="6705600" cy="2743200"/>
-          </a:xfrm>
-          <a:prstGeom prst="rect">
-            <a:avLst/>
-          </a:prstGeom>
-          <a:noFill/>
-          <a:ln w="9525">
-            <a:noFill/>
-            <a:miter lim="800000"/>
-            <a:headEnd/>
-            <a:tailEnd/>
-          </a:ln>
-          <a:effectLst/>
-        </p:spPr>
-        <p:txBody>
-          <a:bodyPr vert="horz" wrap="square" lIns="0" tIns="0" rIns="0" bIns="0" numCol="1" anchor="t" anchorCtr="0" compatLnSpc="1">
-            <a:prstTxWarp prst="textNoShape">
-              <a:avLst/>
-            </a:prstTxWarp>
-          </a:bodyPr>
-          <a:lstStyle/>
-          <a:p>
-            <a:pPr marL="342900" lvl="0" indent="-342900" eaLnBrk="1" hangingPunct="1">
-              <a:lnSpc>
-                <a:spcPct val="120000"/>
-              </a:lnSpc>
-              <a:spcBef>
-                <a:spcPct val="20000"/>
-              </a:spcBef>
-              <a:buClr>
-                <a:srgbClr val="F10040"/>
-              </a:buClr>
-              <a:buFont typeface="Wingdings" pitchFamily="2" charset="2"/>
-              <a:buChar char="§"/>
-            </a:pPr>
-            <a:r>
-              <a:rPr lang="en-CA" b="1" kern="0" dirty="0" smtClean="0">
-                <a:latin typeface="+mn-lt"/>
-              </a:rPr>
-              <a:t>Grids: </a:t>
-            </a:r>
-            <a:r>
-              <a:rPr lang="en-CA" kern="0" dirty="0" smtClean="0">
-                <a:latin typeface="+mn-lt"/>
-              </a:rPr>
-              <a:t>Interoperability and security are primary concerns. Grid sites are often run by separate administrative authorities with heterogeneous hardware, and therefore the use of standardized interfaces, protocols, toolsets, and middleware is essential.</a:t>
-            </a:r>
-            <a:endParaRPr lang="en-CA" kern="0" dirty="0" smtClean="0">
-              <a:latin typeface="+mn-lt"/>
-            </a:endParaRPr>
-          </a:p>
-          <a:p>
-            <a:pPr marL="342900" marR="0" lvl="0" indent="-342900" algn="l" defTabSz="914400" rtl="0" eaLnBrk="1" fontAlgn="base" latinLnBrk="0" hangingPunct="1">
-              <a:lnSpc>
-                <a:spcPct val="120000"/>
-              </a:lnSpc>
-              <a:spcBef>
-                <a:spcPct val="20000"/>
-              </a:spcBef>
-              <a:spcAft>
-                <a:spcPct val="0"/>
-              </a:spcAft>
-              <a:buClr>
-                <a:srgbClr val="F10040"/>
-              </a:buClr>
-              <a:buSzTx/>
-              <a:buFont typeface="Wingdings" pitchFamily="2" charset="2"/>
-              <a:buChar char="§"/>
-              <a:tabLst/>
-              <a:defRPr/>
-            </a:pPr>
-            <a:endParaRPr kumimoji="0" lang="en-CA" sz="2400" b="0" i="0" u="none" strike="noStrike" kern="0" cap="none" spc="0" normalizeH="0" baseline="0" noProof="0" dirty="0" smtClean="0">
-              <a:ln>
-                <a:noFill/>
-              </a:ln>
-              <a:solidFill>
-                <a:schemeClr val="tx1"/>
-              </a:solidFill>
-              <a:effectLst/>
-              <a:uLnTx/>
-              <a:uFillTx/>
-              <a:latin typeface="+mn-lt"/>
-              <a:ea typeface="+mn-ea"/>
-              <a:cs typeface="+mn-cs"/>
-            </a:endParaRPr>
-          </a:p>
-        </p:txBody>
-      </p:sp>
-    </p:spTree>
-  </p:cSld>
-  <p:clrMapOvr>
-    <a:masterClrMapping/>
-  </p:clrMapOvr>
-  <p:transition>
-    <p:fade/>
-  </p:transition>
-  <p:timing>
-    <p:tnLst>
-      <p:par>
-        <p:cTn id="1" dur="indefinite" restart="never" nodeType="tmRoot"/>
-      </p:par>
-    </p:tnLst>
-  </p:timing>
-</p:sld>
-</file>
-
-<file path=ppt/slides/slide14.xml><?xml version="1.0" encoding="utf-8"?>
-<p:sld xmlns:a="http://schemas.openxmlformats.org/drawingml/2006/main" xmlns:r="http://schemas.openxmlformats.org/officeDocument/2006/relationships" xmlns:p="http://schemas.openxmlformats.org/presentationml/2006/main">
-  <p:cSld>
-    <p:spTree>
-      <p:nvGrpSpPr>
-        <p:cNvPr id="1" name=""/>
-        <p:cNvGrpSpPr/>
-        <p:nvPr/>
-      </p:nvGrpSpPr>
-      <p:grpSpPr>
-        <a:xfrm>
-          <a:off x="0" y="0"/>
-          <a:ext cx="0" cy="0"/>
-          <a:chOff x="0" y="0"/>
-          <a:chExt cx="0" cy="0"/>
-        </a:xfrm>
-      </p:grpSpPr>
-      <p:sp>
-        <p:nvSpPr>
-          <p:cNvPr id="4" name="Slide Number Placeholder 3"/>
-          <p:cNvSpPr>
-            <a:spLocks noGrp="1"/>
-          </p:cNvSpPr>
-          <p:nvPr>
-            <p:ph type="sldNum" sz="quarter" idx="10"/>
-          </p:nvPr>
-        </p:nvSpPr>
-        <p:spPr/>
-        <p:txBody>
-          <a:bodyPr/>
-          <a:lstStyle/>
-          <a:p>
-            <a:fld id="{284CB430-D7DB-450E-8FF5-AD4ED9D28849}" type="slidenum">
-              <a:rPr lang="en-US"/>
-              <a:pPr/>
-              <a:t>14</a:t>
-            </a:fld>
-            <a:endParaRPr lang="en-US"/>
-          </a:p>
-        </p:txBody>
-      </p:sp>
-      <p:sp>
-        <p:nvSpPr>
-          <p:cNvPr id="4100" name="Rectangle 4"/>
-          <p:cNvSpPr>
-            <a:spLocks noGrp="1" noChangeArrowheads="1"/>
-          </p:cNvSpPr>
-          <p:nvPr>
-            <p:ph type="title"/>
-          </p:nvPr>
-        </p:nvSpPr>
         <p:spPr/>
         <p:txBody>
           <a:bodyPr/>
@@ -6107,19 +5691,7 @@
           <a:p>
             <a:r>
               <a:rPr lang="en-CA" sz="1400" dirty="0" smtClean="0"/>
-              <a:t>[</a:t>
-            </a:r>
-            <a:r>
-              <a:rPr lang="en-CA" sz="1400" dirty="0" smtClean="0"/>
-              <a:t>ac1] </a:t>
-            </a:r>
-            <a:r>
-              <a:rPr lang="en-CA" sz="1400" dirty="0" smtClean="0"/>
-              <a:t>“Cloud computing versus grid computing,” http://www.ibm.com/developerworks/web/library/wa-cloudgrid/ Accessed Mar. 15, </a:t>
-            </a:r>
-            <a:r>
-              <a:rPr lang="en-CA" sz="1400" dirty="0" smtClean="0"/>
-              <a:t>2011</a:t>
+              <a:t>[ac1] “Cloud computing versus grid computing,” http://www.ibm.com/developerworks/web/library/wa-cloudgrid/ Accessed Mar. 15, 2011</a:t>
             </a:r>
             <a:endParaRPr lang="en-CA" sz="1400" dirty="0" smtClean="0">
               <a:solidFill>
@@ -6152,82 +5724,25 @@
             </a:r>
             <a:r>
               <a:rPr lang="en-CA" sz="1400" dirty="0" smtClean="0"/>
-              <a:t>,</a:t>
-            </a:r>
+              <a:t>, S. Lu, ”Cloud Computing and Grid Computing 360 – Degree Compared,” in Proceedings of the Grid Computing Environments Workshop, 2008. GCE '08 , pp. 1 – 10, Austin, TX, Nov. 12 – 16, 2008.  </a:t>
+            </a:r>
+          </a:p>
+          <a:p>
             <a:r>
               <a:rPr lang="en-CA" sz="1400" dirty="0" smtClean="0"/>
-              <a:t> S. Lu,</a:t>
-            </a:r>
+              <a:t>[ac3] “Windows Azure | Microsoft Platform Hosting,” http://www.microsoft.com/windowsazure/windowsazure/ Accessed Mar. 15, 2011</a:t>
+            </a:r>
+          </a:p>
+          <a:p>
             <a:r>
               <a:rPr lang="en-CA" sz="1400" dirty="0" smtClean="0"/>
-              <a:t> </a:t>
-            </a:r>
+              <a:t>[ac4] “Amazon Elastic Compute Cloud (Amazon EC2),” http://aws.amazon.com/ec2/ Accessed Mar. 15, 2011</a:t>
+            </a:r>
+          </a:p>
+          <a:p>
             <a:r>
               <a:rPr lang="en-CA" sz="1400" dirty="0" smtClean="0"/>
-              <a:t>”Cloud Computing and Grid Computing 360 – Degree Compared,” in Proceedings of </a:t>
-            </a:r>
-            <a:r>
-              <a:rPr lang="en-CA" sz="1400" dirty="0" smtClean="0"/>
-              <a:t>the Grid Computing Environments Workshop, 2008. GCE '08 </a:t>
-            </a:r>
-            <a:r>
-              <a:rPr lang="en-CA" sz="1400" dirty="0" smtClean="0"/>
-              <a:t>, pp. 1 – 10, Austin, TX, Nov. 12 – 16, 2008.</a:t>
-            </a:r>
-            <a:r>
-              <a:rPr lang="en-CA" sz="1400" dirty="0" smtClean="0"/>
-              <a:t>  </a:t>
-            </a:r>
-            <a:endParaRPr lang="en-CA" sz="1400" dirty="0" smtClean="0"/>
-          </a:p>
-          <a:p>
-            <a:r>
-              <a:rPr lang="en-CA" sz="1400" dirty="0" smtClean="0"/>
-              <a:t>[ac3] “Windows Azure | </a:t>
-            </a:r>
-            <a:r>
-              <a:rPr lang="en-CA" sz="1400" dirty="0" smtClean="0"/>
-              <a:t>Microsoft Platform </a:t>
-            </a:r>
-            <a:r>
-              <a:rPr lang="en-CA" sz="1400" dirty="0" smtClean="0"/>
-              <a:t>Hosting,” http</a:t>
-            </a:r>
-            <a:r>
-              <a:rPr lang="en-CA" sz="1400" dirty="0" smtClean="0"/>
-              <a:t>://www.microsoft.com/windowsazure/windowsazure</a:t>
-            </a:r>
-            <a:r>
-              <a:rPr lang="en-CA" sz="1400" dirty="0" smtClean="0"/>
-              <a:t>/ Accessed Mar. 15, 2011</a:t>
-            </a:r>
-          </a:p>
-          <a:p>
-            <a:r>
-              <a:rPr lang="en-CA" sz="1400" dirty="0" smtClean="0"/>
-              <a:t>[ac4] “Amazon Elastic Compute Cloud </a:t>
-            </a:r>
-            <a:r>
-              <a:rPr lang="en-CA" sz="1400" dirty="0" smtClean="0"/>
-              <a:t>(Amazon EC2),” http://aws.amazon.com/ec2</a:t>
-            </a:r>
-            <a:r>
-              <a:rPr lang="en-CA" sz="1400" dirty="0" smtClean="0"/>
-              <a:t>/ Accessed Mar. 15, 2011</a:t>
-            </a:r>
-          </a:p>
-          <a:p>
-            <a:r>
-              <a:rPr lang="en-CA" sz="1400" dirty="0" smtClean="0"/>
-              <a:t>[ac5] </a:t>
-            </a:r>
-            <a:r>
-              <a:rPr lang="en-CA" sz="1400" dirty="0" smtClean="0"/>
-              <a:t>“Google App Engine,” http://code.google.com/appengine</a:t>
-            </a:r>
-            <a:r>
-              <a:rPr lang="en-CA" sz="1400" dirty="0" smtClean="0"/>
-              <a:t>/ Accessed Mar. 15, 2011</a:t>
+              <a:t>[ac5] “Google App Engine,” http://code.google.com/appengine/ Accessed Mar. 15, 2011</a:t>
             </a:r>
           </a:p>
           <a:p>
@@ -6241,15 +5756,7 @@
             </a:r>
             <a:r>
               <a:rPr lang="en-CA" sz="1400" dirty="0" smtClean="0"/>
-              <a:t> </a:t>
-            </a:r>
-            <a:r>
-              <a:rPr lang="en-CA" sz="1400" dirty="0" smtClean="0"/>
-              <a:t>Virtualization Software”, http://www.vmware.com</a:t>
-            </a:r>
-            <a:r>
-              <a:rPr lang="en-CA" sz="1400" dirty="0" smtClean="0"/>
-              <a:t>/ Accessed Mar. 15, 2011</a:t>
+              <a:t> Virtualization Software”, http://www.vmware.com/ Accessed Mar. 15, 2011</a:t>
             </a:r>
           </a:p>
           <a:p>
@@ -6263,13 +5770,8 @@
             </a:r>
             <a:r>
               <a:rPr lang="en-CA" sz="1400" dirty="0" smtClean="0"/>
-              <a:t>”, https://www.teragrid.org</a:t>
-            </a:r>
-            <a:r>
-              <a:rPr lang="en-CA" sz="1400" dirty="0" smtClean="0"/>
-              <a:t>/ Accessed Mar. 15, 2011</a:t>
-            </a:r>
-            <a:endParaRPr lang="en-CA" sz="1400" dirty="0" smtClean="0"/>
+              <a:t>”, https://www.teragrid.org/ Accessed Mar. 15, 2011</a:t>
+            </a:r>
           </a:p>
         </p:txBody>
       </p:sp>
@@ -6760,7 +6262,15 @@
           <a:p>
             <a:r>
               <a:rPr lang="en-US" dirty="0" smtClean="0"/>
-              <a:t>What is a Cloud computing system?</a:t>
+              <a:t>What is a Cloud computing </a:t>
+            </a:r>
+            <a:r>
+              <a:rPr lang="en-US" dirty="0" smtClean="0"/>
+              <a:t>System</a:t>
+            </a:r>
+            <a:r>
+              <a:rPr lang="en-US" dirty="0" smtClean="0"/>
+              <a:t>?</a:t>
             </a:r>
             <a:endParaRPr lang="en-US" dirty="0"/>
           </a:p>
@@ -6948,7 +6458,7 @@
           <a:p>
             <a:r>
               <a:rPr lang="en-US" dirty="0" smtClean="0"/>
-              <a:t>What is a Cloud computing system?</a:t>
+              <a:t>What is a  Cloud Computing System?</a:t>
             </a:r>
             <a:endParaRPr lang="en-US" dirty="0"/>
           </a:p>
@@ -6966,7 +6476,7 @@
         </p:nvSpPr>
         <p:spPr>
           <a:xfrm>
-            <a:off x="1981200" y="1752600"/>
+            <a:off x="1981200" y="1676400"/>
             <a:ext cx="6858000" cy="4419600"/>
           </a:xfrm>
         </p:spPr>
@@ -6974,9 +6484,11 @@
           <a:bodyPr/>
           <a:lstStyle/>
           <a:p>
-            <a:pPr lvl="0"/>
-            <a:r>
-              <a:rPr lang="en-CA" sz="2400" dirty="0" smtClean="0">
+            <a:pPr lvl="0">
+              <a:buNone/>
+            </a:pPr>
+            <a:r>
+              <a:rPr lang="en-CA" sz="2200" dirty="0" smtClean="0">
                 <a:solidFill>
                   <a:schemeClr val="tx1"/>
                 </a:solidFill>
@@ -6984,9 +6496,151 @@
                 <a:ea typeface="+mn-ea"/>
                 <a:cs typeface="+mn-cs"/>
               </a:rPr>
-              <a:t>“A large-scale distributed computing paradigm this is driven by economies of scale, in which a pool of abstracted, virtualized, dynamically scalable, managed computing power, storage, platforms, and services are delivered on demand to external customers over the internet.” [ac2]</a:t>
-            </a:r>
-            <a:endParaRPr lang="en-CA" sz="2400" dirty="0">
+              <a:t>Characteristics [ac2]:</a:t>
+            </a:r>
+            <a:endParaRPr lang="en-CA" sz="2200" dirty="0" smtClean="0">
+              <a:solidFill>
+                <a:schemeClr val="tx1"/>
+              </a:solidFill>
+              <a:latin typeface="+mn-lt"/>
+              <a:ea typeface="+mn-ea"/>
+              <a:cs typeface="+mn-cs"/>
+            </a:endParaRPr>
+          </a:p>
+          <a:p>
+            <a:pPr lvl="0"/>
+            <a:r>
+              <a:rPr lang="en-CA" sz="2200" b="1" dirty="0" smtClean="0">
+                <a:ea typeface="+mn-ea"/>
+                <a:cs typeface="+mn-cs"/>
+              </a:rPr>
+              <a:t>Scalability: </a:t>
+            </a:r>
+            <a:r>
+              <a:rPr lang="en-CA" sz="2200" dirty="0" smtClean="0">
+                <a:ea typeface="+mn-ea"/>
+                <a:cs typeface="+mn-cs"/>
+              </a:rPr>
+              <a:t>Cloud systems are massively scalable.</a:t>
+            </a:r>
+          </a:p>
+          <a:p>
+            <a:pPr lvl="0"/>
+            <a:r>
+              <a:rPr lang="en-CA" sz="2200" b="1" dirty="0" smtClean="0">
+                <a:solidFill>
+                  <a:schemeClr val="tx1"/>
+                </a:solidFill>
+                <a:latin typeface="+mn-lt"/>
+                <a:ea typeface="+mn-ea"/>
+                <a:cs typeface="+mn-cs"/>
+              </a:rPr>
+              <a:t>Economies of </a:t>
+            </a:r>
+            <a:r>
+              <a:rPr lang="en-CA" sz="2200" b="1" dirty="0" smtClean="0">
+                <a:solidFill>
+                  <a:schemeClr val="tx1"/>
+                </a:solidFill>
+                <a:latin typeface="+mn-lt"/>
+                <a:ea typeface="+mn-ea"/>
+                <a:cs typeface="+mn-cs"/>
+              </a:rPr>
+              <a:t>Scale</a:t>
+            </a:r>
+            <a:r>
+              <a:rPr lang="en-CA" sz="2200" b="1" dirty="0" smtClean="0">
+                <a:solidFill>
+                  <a:schemeClr val="tx1"/>
+                </a:solidFill>
+                <a:latin typeface="+mn-lt"/>
+                <a:ea typeface="+mn-ea"/>
+                <a:cs typeface="+mn-cs"/>
+              </a:rPr>
+              <a:t>: </a:t>
+            </a:r>
+            <a:r>
+              <a:rPr lang="en-CA" sz="2200" dirty="0" smtClean="0">
+                <a:solidFill>
+                  <a:schemeClr val="tx1"/>
+                </a:solidFill>
+                <a:latin typeface="+mn-lt"/>
+                <a:ea typeface="+mn-ea"/>
+                <a:cs typeface="+mn-cs"/>
+              </a:rPr>
+              <a:t>Cloud systems are feasible because of </a:t>
+            </a:r>
+            <a:r>
+              <a:rPr lang="en-CA" sz="2200" dirty="0" smtClean="0">
+                <a:ea typeface="+mn-ea"/>
+                <a:cs typeface="+mn-cs"/>
+              </a:rPr>
+              <a:t>reduced operating cost due to</a:t>
+            </a:r>
+            <a:r>
+              <a:rPr lang="en-CA" sz="2200" dirty="0" smtClean="0">
+                <a:solidFill>
+                  <a:schemeClr val="tx1"/>
+                </a:solidFill>
+                <a:latin typeface="+mn-lt"/>
+                <a:ea typeface="+mn-ea"/>
+                <a:cs typeface="+mn-cs"/>
+              </a:rPr>
+              <a:t> economies of scale.</a:t>
+            </a:r>
+          </a:p>
+          <a:p>
+            <a:pPr lvl="0"/>
+            <a:r>
+              <a:rPr lang="en-CA" sz="2200" b="1" dirty="0" smtClean="0">
+                <a:ea typeface="+mn-ea"/>
+                <a:cs typeface="+mn-cs"/>
+              </a:rPr>
+              <a:t>Software as a Service: </a:t>
+            </a:r>
+            <a:r>
+              <a:rPr lang="en-CA" sz="2200" dirty="0" smtClean="0"/>
+              <a:t>Cloud systems</a:t>
+            </a:r>
+            <a:r>
+              <a:rPr lang="en-CA" sz="2200" dirty="0" smtClean="0">
+                <a:ea typeface="+mn-ea"/>
+                <a:cs typeface="+mn-cs"/>
+              </a:rPr>
+              <a:t> can be encapsulated as an abstract entity that offers services to outside customers (the internal hardware in abstracted away from a client perspective)</a:t>
+            </a:r>
+          </a:p>
+          <a:p>
+            <a:pPr lvl="0"/>
+            <a:r>
+              <a:rPr lang="en-CA" sz="2200" b="1" dirty="0" smtClean="0">
+                <a:ea typeface="+mn-ea"/>
+                <a:cs typeface="+mn-cs"/>
+              </a:rPr>
+              <a:t>On-Demand Load Balancing: </a:t>
+            </a:r>
+            <a:r>
+              <a:rPr lang="en-CA" sz="2200" dirty="0" smtClean="0">
+                <a:ea typeface="+mn-ea"/>
+                <a:cs typeface="+mn-cs"/>
+              </a:rPr>
+              <a:t>Cloud services can be dynamically configured and delivered on demand (usually through </a:t>
+            </a:r>
+            <a:r>
+              <a:rPr lang="en-CA" sz="2200" b="1" dirty="0" smtClean="0">
+                <a:ea typeface="+mn-ea"/>
+                <a:cs typeface="+mn-cs"/>
+              </a:rPr>
+              <a:t>virtualization</a:t>
+            </a:r>
+            <a:r>
+              <a:rPr lang="en-CA" sz="2200" dirty="0" smtClean="0">
+                <a:ea typeface="+mn-ea"/>
+                <a:cs typeface="+mn-cs"/>
+              </a:rPr>
+              <a:t>)</a:t>
+            </a:r>
+            <a:endParaRPr lang="en-CA" sz="2200" dirty="0">
               <a:solidFill>
                 <a:schemeClr val="tx1"/>
               </a:solidFill>
@@ -7075,10 +6729,10 @@
           <a:lstStyle/>
           <a:p>
             <a:r>
-              <a:rPr lang="en-US" dirty="0" smtClean="0"/>
-              <a:t>Distinguishing Features of Cloud Computing Systems</a:t>
-            </a:r>
-            <a:endParaRPr lang="en-US" dirty="0"/>
+              <a:rPr lang="en-US" b="1" dirty="0" smtClean="0"/>
+              <a:t>Similarities</a:t>
+            </a:r>
+            <a:endParaRPr lang="en-US" b="1" dirty="0"/>
           </a:p>
         </p:txBody>
       </p:sp>
@@ -7094,7 +6748,7 @@
         </p:nvSpPr>
         <p:spPr>
           <a:xfrm>
-            <a:off x="1981200" y="1676400"/>
+            <a:off x="1981200" y="2057400"/>
             <a:ext cx="6858000" cy="4419600"/>
           </a:xfrm>
         </p:spPr>
@@ -7102,10 +6756,37 @@
           <a:bodyPr/>
           <a:lstStyle/>
           <a:p>
-            <a:pPr lvl="0">
-              <a:buNone/>
-            </a:pPr>
-            <a:endParaRPr lang="en-CA" sz="2200" dirty="0" smtClean="0">
+            <a:r>
+              <a:rPr lang="en-CA" sz="2400" dirty="0" smtClean="0"/>
+              <a:t>Both paradigms share a similar vision: To </a:t>
+            </a:r>
+            <a:r>
+              <a:rPr lang="en-CA" sz="2400" b="1" dirty="0" smtClean="0"/>
+              <a:t>reduce costs</a:t>
+            </a:r>
+            <a:r>
+              <a:rPr lang="en-CA" sz="2400" dirty="0" smtClean="0"/>
+              <a:t>,</a:t>
+            </a:r>
+            <a:r>
+              <a:rPr lang="en-CA" sz="2400" b="1" dirty="0" smtClean="0"/>
+              <a:t> increase flexibility </a:t>
+            </a:r>
+            <a:r>
+              <a:rPr lang="en-CA" sz="2400" dirty="0" smtClean="0"/>
+              <a:t>and </a:t>
+            </a:r>
+            <a:r>
+              <a:rPr lang="en-CA" sz="2400" b="1" dirty="0" smtClean="0"/>
+              <a:t>increase reliability</a:t>
+            </a:r>
+            <a:r>
+              <a:rPr lang="en-CA" sz="2400" dirty="0" smtClean="0"/>
+              <a:t> by delivering computational power as a utility operated by a third party.</a:t>
+            </a:r>
+          </a:p>
+          <a:p>
+            <a:endParaRPr lang="en-CA" sz="2400" dirty="0" smtClean="0">
               <a:solidFill>
                 <a:schemeClr val="tx1"/>
               </a:solidFill>
@@ -7115,117 +6796,11 @@
             </a:endParaRPr>
           </a:p>
           <a:p>
-            <a:pPr lvl="0"/>
-            <a:r>
-              <a:rPr lang="en-CA" sz="2200" b="1" dirty="0" smtClean="0">
-                <a:ea typeface="+mn-ea"/>
-                <a:cs typeface="+mn-cs"/>
-              </a:rPr>
-              <a:t>Scalability: </a:t>
-            </a:r>
-            <a:r>
-              <a:rPr lang="en-CA" sz="2200" dirty="0" smtClean="0">
-                <a:ea typeface="+mn-ea"/>
-                <a:cs typeface="+mn-cs"/>
-              </a:rPr>
-              <a:t>Cloud systems are massively scalable.</a:t>
-            </a:r>
-          </a:p>
-          <a:p>
-            <a:pPr lvl="0"/>
-            <a:r>
-              <a:rPr lang="en-CA" sz="2200" b="1" dirty="0" smtClean="0">
-                <a:solidFill>
-                  <a:schemeClr val="tx1"/>
-                </a:solidFill>
-                <a:latin typeface="+mn-lt"/>
-                <a:ea typeface="+mn-ea"/>
-                <a:cs typeface="+mn-cs"/>
-              </a:rPr>
-              <a:t>Economies of scale: </a:t>
-            </a:r>
-            <a:r>
-              <a:rPr lang="en-CA" sz="2200" dirty="0" smtClean="0">
-                <a:solidFill>
-                  <a:schemeClr val="tx1"/>
-                </a:solidFill>
-                <a:latin typeface="+mn-lt"/>
-                <a:ea typeface="+mn-ea"/>
-                <a:cs typeface="+mn-cs"/>
-              </a:rPr>
-              <a:t>Cloud systems are feasible because of </a:t>
-            </a:r>
-            <a:r>
-              <a:rPr lang="en-CA" sz="2200" dirty="0" smtClean="0">
-                <a:ea typeface="+mn-ea"/>
-                <a:cs typeface="+mn-cs"/>
-              </a:rPr>
-              <a:t>reduced operating cost due to</a:t>
-            </a:r>
-            <a:r>
-              <a:rPr lang="en-CA" sz="2200" dirty="0" smtClean="0">
-                <a:solidFill>
-                  <a:schemeClr val="tx1"/>
-                </a:solidFill>
-                <a:latin typeface="+mn-lt"/>
-                <a:ea typeface="+mn-ea"/>
-                <a:cs typeface="+mn-cs"/>
-              </a:rPr>
-              <a:t> economies of scale.</a:t>
-            </a:r>
-          </a:p>
-          <a:p>
-            <a:pPr lvl="0"/>
-            <a:r>
-              <a:rPr lang="en-CA" sz="2200" b="1" dirty="0" smtClean="0">
-                <a:ea typeface="+mn-ea"/>
-                <a:cs typeface="+mn-cs"/>
-              </a:rPr>
-              <a:t>Software as a Service: </a:t>
-            </a:r>
-            <a:r>
-              <a:rPr lang="en-CA" sz="2200" dirty="0" smtClean="0"/>
-              <a:t>Cloud systems</a:t>
-            </a:r>
-            <a:r>
-              <a:rPr lang="en-CA" sz="2200" dirty="0" smtClean="0">
-                <a:ea typeface="+mn-ea"/>
-                <a:cs typeface="+mn-cs"/>
-              </a:rPr>
-              <a:t> can be encapsulated as an abstract entity that offers services to outside customers (the internal hardware in abstracted away from a client perspective)</a:t>
-            </a:r>
-          </a:p>
-          <a:p>
-            <a:pPr lvl="0"/>
-            <a:r>
-              <a:rPr lang="en-CA" sz="2200" b="1" dirty="0" smtClean="0">
-                <a:ea typeface="+mn-ea"/>
-                <a:cs typeface="+mn-cs"/>
-              </a:rPr>
-              <a:t>On-Demand Load Balancing: </a:t>
-            </a:r>
-            <a:r>
-              <a:rPr lang="en-CA" sz="2200" dirty="0" smtClean="0">
-                <a:ea typeface="+mn-ea"/>
-                <a:cs typeface="+mn-cs"/>
-              </a:rPr>
-              <a:t>Cloud services can be dynamically configured and delivered on demand (usually through </a:t>
-            </a:r>
-            <a:r>
-              <a:rPr lang="en-CA" sz="2200" b="1" dirty="0" smtClean="0">
-                <a:ea typeface="+mn-ea"/>
-                <a:cs typeface="+mn-cs"/>
-              </a:rPr>
-              <a:t>virtualization</a:t>
-            </a:r>
-            <a:r>
-              <a:rPr lang="en-CA" sz="2200" dirty="0" smtClean="0">
-                <a:ea typeface="+mn-ea"/>
-                <a:cs typeface="+mn-cs"/>
-              </a:rPr>
-              <a:t>)</a:t>
-            </a:r>
-            <a:endParaRPr lang="en-CA" sz="2200" dirty="0">
+            <a:r>
+              <a:rPr lang="en-CA" sz="2400" dirty="0" smtClean="0"/>
+              <a:t>Both paradigms face many of the same implementation challenges.</a:t>
+            </a:r>
+            <a:endParaRPr lang="en-CA" sz="2400" dirty="0">
               <a:solidFill>
                 <a:schemeClr val="tx1"/>
               </a:solidFill>
@@ -7233,9 +6808,6 @@
               <a:ea typeface="+mn-ea"/>
               <a:cs typeface="+mn-cs"/>
             </a:endParaRPr>
-          </a:p>
-          <a:p>
-            <a:endParaRPr lang="en-US" dirty="0"/>
           </a:p>
         </p:txBody>
       </p:sp>
@@ -7274,167 +6846,6 @@
           <a:chExt cx="0" cy="0"/>
         </a:xfrm>
       </p:grpSpPr>
-      <p:sp>
-        <p:nvSpPr>
-          <p:cNvPr id="4" name="Slide Number Placeholder 3"/>
-          <p:cNvSpPr>
-            <a:spLocks noGrp="1"/>
-          </p:cNvSpPr>
-          <p:nvPr>
-            <p:ph type="sldNum" sz="quarter" idx="10"/>
-          </p:nvPr>
-        </p:nvSpPr>
-        <p:spPr/>
-        <p:txBody>
-          <a:bodyPr/>
-          <a:lstStyle/>
-          <a:p>
-            <a:fld id="{284CB430-D7DB-450E-8FF5-AD4ED9D28849}" type="slidenum">
-              <a:rPr lang="en-US"/>
-              <a:pPr/>
-              <a:t>6</a:t>
-            </a:fld>
-            <a:endParaRPr lang="en-US"/>
-          </a:p>
-        </p:txBody>
-      </p:sp>
-      <p:sp>
-        <p:nvSpPr>
-          <p:cNvPr id="4100" name="Rectangle 4"/>
-          <p:cNvSpPr>
-            <a:spLocks noGrp="1" noChangeArrowheads="1"/>
-          </p:cNvSpPr>
-          <p:nvPr>
-            <p:ph type="title"/>
-          </p:nvPr>
-        </p:nvSpPr>
-        <p:spPr/>
-        <p:txBody>
-          <a:bodyPr/>
-          <a:lstStyle/>
-          <a:p>
-            <a:r>
-              <a:rPr lang="en-US" dirty="0" smtClean="0"/>
-              <a:t>Clouds and Grids: </a:t>
-            </a:r>
-            <a:r>
-              <a:rPr lang="en-US" b="1" dirty="0" smtClean="0"/>
-              <a:t>Similarities</a:t>
-            </a:r>
-            <a:endParaRPr lang="en-US" b="1" dirty="0"/>
-          </a:p>
-        </p:txBody>
-      </p:sp>
-      <p:sp>
-        <p:nvSpPr>
-          <p:cNvPr id="4101" name="Rectangle 5"/>
-          <p:cNvSpPr>
-            <a:spLocks noGrp="1" noChangeArrowheads="1"/>
-          </p:cNvSpPr>
-          <p:nvPr>
-            <p:ph type="body" idx="1"/>
-          </p:nvPr>
-        </p:nvSpPr>
-        <p:spPr>
-          <a:xfrm>
-            <a:off x="1981200" y="2057400"/>
-            <a:ext cx="6858000" cy="4419600"/>
-          </a:xfrm>
-        </p:spPr>
-        <p:txBody>
-          <a:bodyPr/>
-          <a:lstStyle/>
-          <a:p>
-            <a:r>
-              <a:rPr lang="en-CA" sz="2400" dirty="0" smtClean="0"/>
-              <a:t>Both paradigms share a similar vision: To </a:t>
-            </a:r>
-            <a:r>
-              <a:rPr lang="en-CA" sz="2400" b="1" dirty="0" smtClean="0"/>
-              <a:t>reduce costs</a:t>
-            </a:r>
-            <a:r>
-              <a:rPr lang="en-CA" sz="2400" dirty="0" smtClean="0"/>
-              <a:t>,</a:t>
-            </a:r>
-            <a:r>
-              <a:rPr lang="en-CA" sz="2400" b="1" dirty="0" smtClean="0"/>
-              <a:t> increase flexibility </a:t>
-            </a:r>
-            <a:r>
-              <a:rPr lang="en-CA" sz="2400" dirty="0" smtClean="0"/>
-              <a:t>and </a:t>
-            </a:r>
-            <a:r>
-              <a:rPr lang="en-CA" sz="2400" b="1" dirty="0" smtClean="0"/>
-              <a:t>increase reliability</a:t>
-            </a:r>
-            <a:r>
-              <a:rPr lang="en-CA" sz="2400" dirty="0" smtClean="0"/>
-              <a:t> by delivering computational power as a utility operated by a third party.</a:t>
-            </a:r>
-          </a:p>
-          <a:p>
-            <a:endParaRPr lang="en-CA" sz="2400" dirty="0" smtClean="0">
-              <a:solidFill>
-                <a:schemeClr val="tx1"/>
-              </a:solidFill>
-              <a:latin typeface="+mn-lt"/>
-              <a:ea typeface="+mn-ea"/>
-              <a:cs typeface="+mn-cs"/>
-            </a:endParaRPr>
-          </a:p>
-          <a:p>
-            <a:r>
-              <a:rPr lang="en-CA" sz="2400" dirty="0" smtClean="0"/>
-              <a:t>Both paradigms face many of the same implementation challenges.</a:t>
-            </a:r>
-            <a:endParaRPr lang="en-CA" sz="2400" dirty="0">
-              <a:solidFill>
-                <a:schemeClr val="tx1"/>
-              </a:solidFill>
-              <a:latin typeface="+mn-lt"/>
-              <a:ea typeface="+mn-ea"/>
-              <a:cs typeface="+mn-cs"/>
-            </a:endParaRPr>
-          </a:p>
-        </p:txBody>
-      </p:sp>
-    </p:spTree>
-  </p:cSld>
-  <p:clrMapOvr>
-    <a:masterClrMapping/>
-  </p:clrMapOvr>
-  <p:transition>
-    <p:fade/>
-  </p:transition>
-  <p:timing>
-    <p:tnLst>
-      <p:par>
-        <p:cTn id="1" dur="indefinite" restart="never" nodeType="tmRoot"/>
-      </p:par>
-    </p:tnLst>
-  </p:timing>
-</p:sld>
-</file>
-
-<file path=ppt/slides/slide7.xml><?xml version="1.0" encoding="utf-8"?>
-<p:sld xmlns:a="http://schemas.openxmlformats.org/drawingml/2006/main" xmlns:r="http://schemas.openxmlformats.org/officeDocument/2006/relationships" xmlns:p="http://schemas.openxmlformats.org/presentationml/2006/main">
-  <p:cSld>
-    <p:spTree>
-      <p:nvGrpSpPr>
-        <p:cNvPr id="1" name=""/>
-        <p:cNvGrpSpPr/>
-        <p:nvPr/>
-      </p:nvGrpSpPr>
-      <p:grpSpPr>
-        <a:xfrm>
-          <a:off x="0" y="0"/>
-          <a:ext cx="0" cy="0"/>
-          <a:chOff x="0" y="0"/>
-          <a:chExt cx="0" cy="0"/>
-        </a:xfrm>
-      </p:grpSpPr>
       <p:pic>
         <p:nvPicPr>
           <p:cNvPr id="1027" name="Picture 3"/>
@@ -7445,15 +6856,15 @@
         </p:nvPicPr>
         <p:blipFill>
           <a:blip r:embed="rId3" cstate="print"/>
-          <a:srcRect/>
+          <a:srcRect t="18347" b="18347"/>
           <a:stretch>
             <a:fillRect/>
           </a:stretch>
         </p:blipFill>
         <p:spPr bwMode="auto">
           <a:xfrm>
-            <a:off x="1981200" y="3810000"/>
-            <a:ext cx="3962400" cy="1774466"/>
+            <a:off x="2209799" y="4038601"/>
+            <a:ext cx="3714721" cy="1053120"/>
           </a:xfrm>
           <a:prstGeom prst="rect">
             <a:avLst/>
@@ -7485,7 +6896,7 @@
             <a:fld id="{284CB430-D7DB-450E-8FF5-AD4ED9D28849}" type="slidenum">
               <a:rPr lang="en-US"/>
               <a:pPr/>
-              <a:t>7</a:t>
+              <a:t>6</a:t>
             </a:fld>
             <a:endParaRPr lang="en-US"/>
           </a:p>
@@ -7507,12 +6918,12 @@
           <a:lstStyle/>
           <a:p>
             <a:r>
-              <a:rPr lang="en-US" dirty="0" smtClean="0"/>
-              <a:t>Clouds and Grids: </a:t>
-            </a:r>
-            <a:r>
               <a:rPr lang="en-US" b="1" dirty="0" smtClean="0"/>
-              <a:t>Differing Scales</a:t>
+              <a:t>Differing </a:t>
+            </a:r>
+            <a:r>
+              <a:rPr lang="en-US" b="1" dirty="0" smtClean="0"/>
+              <a:t>Scales</a:t>
             </a:r>
             <a:endParaRPr lang="en-US" b="1" dirty="0"/>
           </a:p>
@@ -7593,7 +7004,7 @@
         </p:blipFill>
         <p:spPr bwMode="auto">
           <a:xfrm>
-            <a:off x="2301240" y="5257800"/>
+            <a:off x="2301240" y="5181600"/>
             <a:ext cx="2499360" cy="914400"/>
           </a:xfrm>
           <a:prstGeom prst="rect">
@@ -7705,6 +7116,335 @@
 </p:sld>
 </file>
 
+<file path=ppt/slides/slide7.xml><?xml version="1.0" encoding="utf-8"?>
+<p:sld xmlns:a="http://schemas.openxmlformats.org/drawingml/2006/main" xmlns:r="http://schemas.openxmlformats.org/officeDocument/2006/relationships" xmlns:p="http://schemas.openxmlformats.org/presentationml/2006/main">
+  <p:cSld>
+    <p:spTree>
+      <p:nvGrpSpPr>
+        <p:cNvPr id="1" name=""/>
+        <p:cNvGrpSpPr/>
+        <p:nvPr/>
+      </p:nvGrpSpPr>
+      <p:grpSpPr>
+        <a:xfrm>
+          <a:off x="0" y="0"/>
+          <a:ext cx="0" cy="0"/>
+          <a:chOff x="0" y="0"/>
+          <a:chExt cx="0" cy="0"/>
+        </a:xfrm>
+      </p:grpSpPr>
+      <p:sp>
+        <p:nvSpPr>
+          <p:cNvPr id="11" name="TextBox 10"/>
+          <p:cNvSpPr txBox="1"/>
+          <p:nvPr/>
+        </p:nvSpPr>
+        <p:spPr>
+          <a:xfrm>
+            <a:off x="6324600" y="3657600"/>
+            <a:ext cx="2667000" cy="2308324"/>
+          </a:xfrm>
+          <a:prstGeom prst="rect">
+            <a:avLst/>
+          </a:prstGeom>
+        </p:spPr>
+        <p:style>
+          <a:lnRef idx="1">
+            <a:schemeClr val="accent5"/>
+          </a:lnRef>
+          <a:fillRef idx="2">
+            <a:schemeClr val="accent5"/>
+          </a:fillRef>
+          <a:effectRef idx="1">
+            <a:schemeClr val="accent5"/>
+          </a:effectRef>
+          <a:fontRef idx="minor">
+            <a:schemeClr val="dk1"/>
+          </a:fontRef>
+        </p:style>
+        <p:txBody>
+          <a:bodyPr wrap="square" rtlCol="0">
+            <a:spAutoFit/>
+          </a:bodyPr>
+          <a:lstStyle/>
+          <a:p>
+            <a:endParaRPr lang="en-CA" sz="1600" dirty="0" smtClean="0">
+              <a:latin typeface="+mn-lt"/>
+            </a:endParaRPr>
+          </a:p>
+          <a:p>
+            <a:endParaRPr lang="en-CA" sz="1600" dirty="0" smtClean="0"/>
+          </a:p>
+          <a:p>
+            <a:endParaRPr lang="en-CA" sz="1600" dirty="0" smtClean="0">
+              <a:latin typeface="+mn-lt"/>
+            </a:endParaRPr>
+          </a:p>
+          <a:p>
+            <a:endParaRPr lang="en-CA" sz="1600" dirty="0" smtClean="0"/>
+          </a:p>
+          <a:p>
+            <a:endParaRPr lang="en-CA" sz="1600" dirty="0" smtClean="0"/>
+          </a:p>
+          <a:p>
+            <a:r>
+              <a:rPr lang="en-CA" sz="1600" dirty="0" err="1" smtClean="0">
+                <a:latin typeface="+mn-lt"/>
+              </a:rPr>
+              <a:t>TeraGrid</a:t>
+            </a:r>
+            <a:r>
+              <a:rPr lang="en-CA" sz="1600" dirty="0" smtClean="0">
+                <a:latin typeface="+mn-lt"/>
+              </a:rPr>
+              <a:t> is a scientific computing Grid with 11 partner sites in North America [ac7]</a:t>
+            </a:r>
+            <a:endParaRPr lang="en-CA" sz="1600" dirty="0">
+              <a:latin typeface="+mn-lt"/>
+            </a:endParaRPr>
+          </a:p>
+        </p:txBody>
+      </p:sp>
+      <p:sp>
+        <p:nvSpPr>
+          <p:cNvPr id="4" name="Slide Number Placeholder 3"/>
+          <p:cNvSpPr>
+            <a:spLocks noGrp="1"/>
+          </p:cNvSpPr>
+          <p:nvPr>
+            <p:ph type="sldNum" sz="quarter" idx="10"/>
+          </p:nvPr>
+        </p:nvSpPr>
+        <p:spPr/>
+        <p:txBody>
+          <a:bodyPr/>
+          <a:lstStyle/>
+          <a:p>
+            <a:fld id="{284CB430-D7DB-450E-8FF5-AD4ED9D28849}" type="slidenum">
+              <a:rPr lang="en-US"/>
+              <a:pPr/>
+              <a:t>7</a:t>
+            </a:fld>
+            <a:endParaRPr lang="en-US"/>
+          </a:p>
+        </p:txBody>
+      </p:sp>
+      <p:sp>
+        <p:nvSpPr>
+          <p:cNvPr id="4100" name="Rectangle 4"/>
+          <p:cNvSpPr>
+            <a:spLocks noGrp="1" noChangeArrowheads="1"/>
+          </p:cNvSpPr>
+          <p:nvPr>
+            <p:ph type="title"/>
+          </p:nvPr>
+        </p:nvSpPr>
+        <p:spPr/>
+        <p:txBody>
+          <a:bodyPr/>
+          <a:lstStyle/>
+          <a:p>
+            <a:r>
+              <a:rPr lang="en-US" b="1" dirty="0" smtClean="0"/>
+              <a:t>Business </a:t>
+            </a:r>
+            <a:r>
+              <a:rPr lang="en-US" b="1" dirty="0" smtClean="0"/>
+              <a:t>Model</a:t>
+            </a:r>
+            <a:endParaRPr lang="en-US" b="1" dirty="0"/>
+          </a:p>
+        </p:txBody>
+      </p:sp>
+      <p:sp>
+        <p:nvSpPr>
+          <p:cNvPr id="4101" name="Rectangle 5"/>
+          <p:cNvSpPr>
+            <a:spLocks noGrp="1" noChangeArrowheads="1"/>
+          </p:cNvSpPr>
+          <p:nvPr>
+            <p:ph type="body" idx="1"/>
+          </p:nvPr>
+        </p:nvSpPr>
+        <p:spPr>
+          <a:xfrm>
+            <a:off x="1981200" y="1676400"/>
+            <a:ext cx="6858000" cy="1981200"/>
+          </a:xfrm>
+        </p:spPr>
+        <p:txBody>
+          <a:bodyPr/>
+          <a:lstStyle/>
+          <a:p>
+            <a:pPr lvl="0"/>
+            <a:r>
+              <a:rPr lang="en-CA" sz="2400" b="1" dirty="0" smtClean="0"/>
+              <a:t>Clouds: </a:t>
+            </a:r>
+            <a:r>
+              <a:rPr lang="en-CA" sz="2400" dirty="0" smtClean="0"/>
+              <a:t>Customers pay for processing power on a consumption basis. Resources are dynamically provisioned, and customers pay only for what they use.</a:t>
+            </a:r>
+          </a:p>
+          <a:p>
+            <a:pPr lvl="0"/>
+            <a:endParaRPr lang="en-CA" sz="2400" dirty="0" smtClean="0">
+              <a:solidFill>
+                <a:schemeClr val="tx1"/>
+              </a:solidFill>
+              <a:latin typeface="+mn-lt"/>
+              <a:ea typeface="+mn-ea"/>
+              <a:cs typeface="+mn-cs"/>
+            </a:endParaRPr>
+          </a:p>
+        </p:txBody>
+      </p:sp>
+      <p:pic>
+        <p:nvPicPr>
+          <p:cNvPr id="2050" name="Picture 2"/>
+          <p:cNvPicPr>
+            <a:picLocks noChangeAspect="1" noChangeArrowheads="1"/>
+          </p:cNvPicPr>
+          <p:nvPr/>
+        </p:nvPicPr>
+        <p:blipFill>
+          <a:blip r:embed="rId3" cstate="print"/>
+          <a:srcRect/>
+          <a:stretch>
+            <a:fillRect/>
+          </a:stretch>
+        </p:blipFill>
+        <p:spPr bwMode="auto">
+          <a:xfrm>
+            <a:off x="6473192" y="3733800"/>
+            <a:ext cx="2442208" cy="1075863"/>
+          </a:xfrm>
+          <a:prstGeom prst="rect">
+            <a:avLst/>
+          </a:prstGeom>
+          <a:noFill/>
+          <a:ln w="9525">
+            <a:noFill/>
+            <a:miter lim="800000"/>
+            <a:headEnd/>
+            <a:tailEnd/>
+          </a:ln>
+        </p:spPr>
+      </p:pic>
+      <p:sp>
+        <p:nvSpPr>
+          <p:cNvPr id="10" name="Rectangle 5"/>
+          <p:cNvSpPr txBox="1">
+            <a:spLocks noChangeArrowheads="1"/>
+          </p:cNvSpPr>
+          <p:nvPr/>
+        </p:nvSpPr>
+        <p:spPr bwMode="auto">
+          <a:xfrm>
+            <a:off x="1981200" y="3657600"/>
+            <a:ext cx="4267200" cy="2743200"/>
+          </a:xfrm>
+          <a:prstGeom prst="rect">
+            <a:avLst/>
+          </a:prstGeom>
+          <a:noFill/>
+          <a:ln w="9525">
+            <a:noFill/>
+            <a:miter lim="800000"/>
+            <a:headEnd/>
+            <a:tailEnd/>
+          </a:ln>
+          <a:effectLst/>
+        </p:spPr>
+        <p:txBody>
+          <a:bodyPr vert="horz" wrap="square" lIns="0" tIns="0" rIns="0" bIns="0" numCol="1" anchor="t" anchorCtr="0" compatLnSpc="1">
+            <a:prstTxWarp prst="textNoShape">
+              <a:avLst/>
+            </a:prstTxWarp>
+          </a:bodyPr>
+          <a:lstStyle/>
+          <a:p>
+            <a:pPr marL="342900" lvl="0" indent="-342900" eaLnBrk="1" hangingPunct="1">
+              <a:lnSpc>
+                <a:spcPct val="120000"/>
+              </a:lnSpc>
+              <a:spcBef>
+                <a:spcPct val="20000"/>
+              </a:spcBef>
+              <a:buClr>
+                <a:srgbClr val="F10040"/>
+              </a:buClr>
+              <a:buFont typeface="Wingdings" pitchFamily="2" charset="2"/>
+              <a:buChar char="§"/>
+            </a:pPr>
+            <a:r>
+              <a:rPr lang="en-CA" b="1" kern="0" dirty="0" smtClean="0">
+                <a:latin typeface="+mn-lt"/>
+              </a:rPr>
+              <a:t>Grids: </a:t>
+            </a:r>
+            <a:r>
+              <a:rPr lang="en-CA" kern="0" dirty="0" smtClean="0">
+                <a:latin typeface="+mn-lt"/>
+              </a:rPr>
+              <a:t>Distribution of resources is project oriented, and projects must submit proposals to obtain a fixed number of service units (ex. CPU hours).</a:t>
+            </a:r>
+          </a:p>
+          <a:p>
+            <a:pPr marL="342900" marR="0" lvl="0" indent="-342900" algn="l" defTabSz="914400" rtl="0" eaLnBrk="1" fontAlgn="base" latinLnBrk="0" hangingPunct="1">
+              <a:lnSpc>
+                <a:spcPct val="120000"/>
+              </a:lnSpc>
+              <a:spcBef>
+                <a:spcPct val="20000"/>
+              </a:spcBef>
+              <a:spcAft>
+                <a:spcPct val="0"/>
+              </a:spcAft>
+              <a:buClr>
+                <a:srgbClr val="F10040"/>
+              </a:buClr>
+              <a:buSzTx/>
+              <a:buFont typeface="Wingdings" pitchFamily="2" charset="2"/>
+              <a:buChar char="§"/>
+              <a:tabLst/>
+              <a:defRPr/>
+            </a:pPr>
+            <a:endParaRPr kumimoji="0" lang="en-CA" sz="2400" b="0" i="0" u="none" strike="noStrike" kern="0" cap="none" spc="0" normalizeH="0" baseline="0" noProof="0" dirty="0" smtClean="0">
+              <a:ln>
+                <a:noFill/>
+              </a:ln>
+              <a:solidFill>
+                <a:schemeClr val="tx1"/>
+              </a:solidFill>
+              <a:effectLst/>
+              <a:uLnTx/>
+              <a:uFillTx/>
+              <a:latin typeface="+mn-lt"/>
+              <a:ea typeface="+mn-ea"/>
+              <a:cs typeface="+mn-cs"/>
+            </a:endParaRPr>
+          </a:p>
+        </p:txBody>
+      </p:sp>
+    </p:spTree>
+  </p:cSld>
+  <p:clrMapOvr>
+    <a:masterClrMapping/>
+  </p:clrMapOvr>
+  <p:transition>
+    <p:fade/>
+  </p:transition>
+  <p:timing>
+    <p:tnLst>
+      <p:par>
+        <p:cTn id="1" dur="indefinite" restart="never" nodeType="tmRoot"/>
+      </p:par>
+    </p:tnLst>
+  </p:timing>
+</p:sld>
+</file>
+
 <file path=ppt/slides/slide8.xml><?xml version="1.0" encoding="utf-8"?>
 <p:sld xmlns:a="http://schemas.openxmlformats.org/drawingml/2006/main" xmlns:r="http://schemas.openxmlformats.org/officeDocument/2006/relationships" xmlns:p="http://schemas.openxmlformats.org/presentationml/2006/main">
   <p:cSld>
@@ -7767,12 +7507,12 @@
           <a:lstStyle/>
           <a:p>
             <a:r>
-              <a:rPr lang="en-US" dirty="0" smtClean="0"/>
-              <a:t>Clouds and Grids:</a:t>
-            </a:r>
-            <a:r>
               <a:rPr lang="en-US" b="1" dirty="0" smtClean="0"/>
-              <a:t> Scheduling Model</a:t>
+              <a:t>Scheduling </a:t>
+            </a:r>
+            <a:r>
+              <a:rPr lang="en-US" b="1" dirty="0" smtClean="0"/>
+              <a:t>Model</a:t>
             </a:r>
             <a:endParaRPr lang="en-US" b="1" dirty="0"/>
           </a:p>
@@ -7879,9 +7619,6 @@
               </a:rPr>
               <a:t>Grids typically use a batch-scheduled model, where batch jobs are scheduled to have dedicated access to specific hardware for a specific amount of time or processing units.</a:t>
             </a:r>
-            <a:endParaRPr lang="en-CA" kern="0" dirty="0" smtClean="0">
-              <a:latin typeface="+mn-lt"/>
-            </a:endParaRPr>
           </a:p>
           <a:p>
             <a:pPr marL="342900" marR="0" lvl="0" indent="-342900" algn="l" defTabSz="914400" rtl="0" eaLnBrk="1" fontAlgn="base" latinLnBrk="0" hangingPunct="1">
@@ -8043,22 +7780,12 @@
             <a:pPr lvl="0"/>
             <a:r>
               <a:rPr lang="en-CA" sz="2400" dirty="0" smtClean="0"/>
-              <a:t>This is accomplished through virtualization,  or software which allows underlying hardware to be abstracted into a pool of shared resources.</a:t>
-            </a:r>
-          </a:p>
-          <a:p>
-            <a:pPr lvl="0"/>
-            <a:endParaRPr lang="en-CA" sz="2400" dirty="0" smtClean="0"/>
-          </a:p>
-          <a:p>
-            <a:pPr lvl="0"/>
+              <a:t>This is accomplished through virtualization,  or software which allows underlying hardware to be abstracted into a pool of shared resources</a:t>
+            </a:r>
             <a:r>
               <a:rPr lang="en-CA" sz="2400" dirty="0" smtClean="0"/>
-              <a:t>While performance limited this technique in the past, hardware support for virtualization now makes this technique feasible.</a:t>
-            </a:r>
-          </a:p>
-          <a:p>
-            <a:pPr lvl="0"/>
+              <a:t>.</a:t>
+            </a:r>
             <a:endParaRPr lang="en-CA" sz="2400" dirty="0" smtClean="0"/>
           </a:p>
         </p:txBody>

</xml_diff>